<commit_message>
Design and Layout Alternative
The export and end user information is used as a view point, it will act
as template for rest of page
</commit_message>
<xml_diff>
--- a/Design Docs/Slide.ppt.pptx
+++ b/Design Docs/Slide.ppt.pptx
@@ -192,7 +192,7 @@
           <a:p>
             <a:fld id="{1A55382D-98E9-484E-8902-FAF620DA3554}" type="datetimeFigureOut">
               <a:rPr lang="en-US" smtClean="0"/>
-              <a:t>5/28/2014</a:t>
+              <a:t>5/29/2014</a:t>
             </a:fld>
             <a:endParaRPr lang="en-US"/>
           </a:p>
@@ -725,7 +725,7 @@
           <a:p>
             <a:fld id="{6E8F695E-387F-4CD0-AE19-3FAE85129620}" type="datetimeFigureOut">
               <a:rPr lang="en-US" smtClean="0"/>
-              <a:t>5/28/2014</a:t>
+              <a:t>5/29/2014</a:t>
             </a:fld>
             <a:endParaRPr lang="en-US" dirty="0"/>
           </a:p>
@@ -895,7 +895,7 @@
           <a:p>
             <a:fld id="{6E8F695E-387F-4CD0-AE19-3FAE85129620}" type="datetimeFigureOut">
               <a:rPr lang="en-US" smtClean="0"/>
-              <a:t>5/28/2014</a:t>
+              <a:t>5/29/2014</a:t>
             </a:fld>
             <a:endParaRPr lang="en-US" dirty="0"/>
           </a:p>
@@ -1075,7 +1075,7 @@
           <a:p>
             <a:fld id="{6E8F695E-387F-4CD0-AE19-3FAE85129620}" type="datetimeFigureOut">
               <a:rPr lang="en-US" smtClean="0"/>
-              <a:t>5/28/2014</a:t>
+              <a:t>5/29/2014</a:t>
             </a:fld>
             <a:endParaRPr lang="en-US" dirty="0"/>
           </a:p>
@@ -1245,7 +1245,7 @@
           <a:p>
             <a:fld id="{6E8F695E-387F-4CD0-AE19-3FAE85129620}" type="datetimeFigureOut">
               <a:rPr lang="en-US" smtClean="0"/>
-              <a:t>5/28/2014</a:t>
+              <a:t>5/29/2014</a:t>
             </a:fld>
             <a:endParaRPr lang="en-US" dirty="0"/>
           </a:p>
@@ -1491,7 +1491,7 @@
           <a:p>
             <a:fld id="{6E8F695E-387F-4CD0-AE19-3FAE85129620}" type="datetimeFigureOut">
               <a:rPr lang="en-US" smtClean="0"/>
-              <a:t>5/28/2014</a:t>
+              <a:t>5/29/2014</a:t>
             </a:fld>
             <a:endParaRPr lang="en-US" dirty="0"/>
           </a:p>
@@ -1779,7 +1779,7 @@
           <a:p>
             <a:fld id="{6E8F695E-387F-4CD0-AE19-3FAE85129620}" type="datetimeFigureOut">
               <a:rPr lang="en-US" smtClean="0"/>
-              <a:t>5/28/2014</a:t>
+              <a:t>5/29/2014</a:t>
             </a:fld>
             <a:endParaRPr lang="en-US" dirty="0"/>
           </a:p>
@@ -2201,7 +2201,7 @@
           <a:p>
             <a:fld id="{6E8F695E-387F-4CD0-AE19-3FAE85129620}" type="datetimeFigureOut">
               <a:rPr lang="en-US" smtClean="0"/>
-              <a:t>5/28/2014</a:t>
+              <a:t>5/29/2014</a:t>
             </a:fld>
             <a:endParaRPr lang="en-US" dirty="0"/>
           </a:p>
@@ -2319,7 +2319,7 @@
           <a:p>
             <a:fld id="{6E8F695E-387F-4CD0-AE19-3FAE85129620}" type="datetimeFigureOut">
               <a:rPr lang="en-US" smtClean="0"/>
-              <a:t>5/28/2014</a:t>
+              <a:t>5/29/2014</a:t>
             </a:fld>
             <a:endParaRPr lang="en-US" dirty="0"/>
           </a:p>
@@ -2414,7 +2414,7 @@
           <a:p>
             <a:fld id="{6E8F695E-387F-4CD0-AE19-3FAE85129620}" type="datetimeFigureOut">
               <a:rPr lang="en-US" smtClean="0"/>
-              <a:t>5/28/2014</a:t>
+              <a:t>5/29/2014</a:t>
             </a:fld>
             <a:endParaRPr lang="en-US" dirty="0"/>
           </a:p>
@@ -2691,7 +2691,7 @@
           <a:p>
             <a:fld id="{6E8F695E-387F-4CD0-AE19-3FAE85129620}" type="datetimeFigureOut">
               <a:rPr lang="en-US" smtClean="0"/>
-              <a:t>5/28/2014</a:t>
+              <a:t>5/29/2014</a:t>
             </a:fld>
             <a:endParaRPr lang="en-US" dirty="0"/>
           </a:p>
@@ -2944,7 +2944,7 @@
           <a:p>
             <a:fld id="{6E8F695E-387F-4CD0-AE19-3FAE85129620}" type="datetimeFigureOut">
               <a:rPr lang="en-US" smtClean="0"/>
-              <a:t>5/28/2014</a:t>
+              <a:t>5/29/2014</a:t>
             </a:fld>
             <a:endParaRPr lang="en-US" dirty="0"/>
           </a:p>
@@ -3157,7 +3157,7 @@
           <a:p>
             <a:fld id="{6E8F695E-387F-4CD0-AE19-3FAE85129620}" type="datetimeFigureOut">
               <a:rPr lang="en-US" smtClean="0"/>
-              <a:t>5/28/2014</a:t>
+              <a:t>5/29/2014</a:t>
             </a:fld>
             <a:endParaRPr lang="en-US" dirty="0"/>
           </a:p>
@@ -3973,7 +3973,7 @@
         <p:spPr>
           <a:xfrm>
             <a:off x="2191514" y="5712023"/>
-            <a:ext cx="1511381" cy="400110"/>
+            <a:ext cx="1511381" cy="338554"/>
           </a:xfrm>
           <a:prstGeom prst="rect">
             <a:avLst/>
@@ -3991,14 +3991,14 @@
               <a:t>    </a:t>
             </a:r>
             <a:r>
-              <a:rPr lang="en-US" sz="2000" b="1" dirty="0" smtClean="0"/>
-              <a:t>????</a:t>
-            </a:r>
-            <a:r>
-              <a:rPr lang="en-US" sz="1400" b="1" dirty="0" smtClean="0"/>
-              <a:t> DB</a:t>
-            </a:r>
-            <a:endParaRPr lang="en-US" sz="1400" b="1" dirty="0"/>
+              <a:rPr lang="en-US" sz="1600" b="1" dirty="0" err="1" smtClean="0"/>
+              <a:t>SQl</a:t>
+            </a:r>
+            <a:r>
+              <a:rPr lang="en-US" sz="1600" b="1" dirty="0" smtClean="0"/>
+              <a:t> Server</a:t>
+            </a:r>
+            <a:endParaRPr lang="en-US" sz="1600" b="1" dirty="0"/>
           </a:p>
         </p:txBody>
       </p:sp>
@@ -4773,8 +4773,8 @@
         </p:nvSpPr>
         <p:spPr>
           <a:xfrm>
-            <a:off x="2064327" y="1619583"/>
-            <a:ext cx="6698673" cy="4687546"/>
+            <a:off x="2064327" y="5712023"/>
+            <a:ext cx="384685" cy="595106"/>
           </a:xfrm>
           <a:prstGeom prst="rect">
             <a:avLst/>
@@ -5045,36 +5045,6 @@
                 </a:schemeClr>
               </a:solidFill>
             </a:endParaRPr>
-          </a:p>
-        </p:txBody>
-      </p:sp>
-      <p:sp>
-        <p:nvSpPr>
-          <p:cNvPr id="4" name="TextBox 3"/>
-          <p:cNvSpPr txBox="1"/>
-          <p:nvPr/>
-        </p:nvSpPr>
-        <p:spPr>
-          <a:xfrm rot="16200000">
-            <a:off x="5183230" y="1886514"/>
-            <a:ext cx="738664" cy="639539"/>
-          </a:xfrm>
-          <a:prstGeom prst="rect">
-            <a:avLst/>
-          </a:prstGeom>
-          <a:noFill/>
-        </p:spPr>
-        <p:txBody>
-          <a:bodyPr vert="eaVert" wrap="square" rtlCol="0">
-            <a:spAutoFit/>
-          </a:bodyPr>
-          <a:lstStyle/>
-          <a:p>
-            <a:r>
-              <a:rPr lang="en-US" sz="3600" dirty="0" smtClean="0"/>
-              <a:t>??</a:t>
-            </a:r>
-            <a:endParaRPr lang="en-US" sz="3600" dirty="0"/>
           </a:p>
         </p:txBody>
       </p:sp>

</xml_diff>